<commit_message>
added additional requirement to specs
</commit_message>
<xml_diff>
--- a/zebrafish_app_specs.pptx
+++ b/zebrafish_app_specs.pptx
@@ -105,6 +105,11 @@
       </a:defRPr>
     </a:lvl9pPr>
   </p:defaultTextStyle>
+  <p:extLst>
+    <p:ext uri="{EFAFB233-063F-42B5-8137-9DF3F51BA10A}">
+      <p15:sldGuideLst xmlns:p15="http://schemas.microsoft.com/office/powerpoint/2012/main"/>
+    </p:ext>
+  </p:extLst>
 </p:presentation>
 </file>
 
@@ -255,7 +260,7 @@
           <a:p>
             <a:fld id="{EE9B9D98-8075-6C49-AFE3-7775BFE0A702}" type="datetimeFigureOut">
               <a:rPr lang="en-US" smtClean="0"/>
-              <a:t>7/6/25</a:t>
+              <a:t>7/7/25</a:t>
             </a:fld>
             <a:endParaRPr lang="en-US"/>
           </a:p>
@@ -453,7 +458,7 @@
           <a:p>
             <a:fld id="{EE9B9D98-8075-6C49-AFE3-7775BFE0A702}" type="datetimeFigureOut">
               <a:rPr lang="en-US" smtClean="0"/>
-              <a:t>7/6/25</a:t>
+              <a:t>7/7/25</a:t>
             </a:fld>
             <a:endParaRPr lang="en-US"/>
           </a:p>
@@ -661,7 +666,7 @@
           <a:p>
             <a:fld id="{EE9B9D98-8075-6C49-AFE3-7775BFE0A702}" type="datetimeFigureOut">
               <a:rPr lang="en-US" smtClean="0"/>
-              <a:t>7/6/25</a:t>
+              <a:t>7/7/25</a:t>
             </a:fld>
             <a:endParaRPr lang="en-US"/>
           </a:p>
@@ -859,7 +864,7 @@
           <a:p>
             <a:fld id="{EE9B9D98-8075-6C49-AFE3-7775BFE0A702}" type="datetimeFigureOut">
               <a:rPr lang="en-US" smtClean="0"/>
-              <a:t>7/6/25</a:t>
+              <a:t>7/7/25</a:t>
             </a:fld>
             <a:endParaRPr lang="en-US"/>
           </a:p>
@@ -1134,7 +1139,7 @@
           <a:p>
             <a:fld id="{EE9B9D98-8075-6C49-AFE3-7775BFE0A702}" type="datetimeFigureOut">
               <a:rPr lang="en-US" smtClean="0"/>
-              <a:t>7/6/25</a:t>
+              <a:t>7/7/25</a:t>
             </a:fld>
             <a:endParaRPr lang="en-US"/>
           </a:p>
@@ -1399,7 +1404,7 @@
           <a:p>
             <a:fld id="{EE9B9D98-8075-6C49-AFE3-7775BFE0A702}" type="datetimeFigureOut">
               <a:rPr lang="en-US" smtClean="0"/>
-              <a:t>7/6/25</a:t>
+              <a:t>7/7/25</a:t>
             </a:fld>
             <a:endParaRPr lang="en-US"/>
           </a:p>
@@ -1811,7 +1816,7 @@
           <a:p>
             <a:fld id="{EE9B9D98-8075-6C49-AFE3-7775BFE0A702}" type="datetimeFigureOut">
               <a:rPr lang="en-US" smtClean="0"/>
-              <a:t>7/6/25</a:t>
+              <a:t>7/7/25</a:t>
             </a:fld>
             <a:endParaRPr lang="en-US"/>
           </a:p>
@@ -1952,7 +1957,7 @@
           <a:p>
             <a:fld id="{EE9B9D98-8075-6C49-AFE3-7775BFE0A702}" type="datetimeFigureOut">
               <a:rPr lang="en-US" smtClean="0"/>
-              <a:t>7/6/25</a:t>
+              <a:t>7/7/25</a:t>
             </a:fld>
             <a:endParaRPr lang="en-US"/>
           </a:p>
@@ -2065,7 +2070,7 @@
           <a:p>
             <a:fld id="{EE9B9D98-8075-6C49-AFE3-7775BFE0A702}" type="datetimeFigureOut">
               <a:rPr lang="en-US" smtClean="0"/>
-              <a:t>7/6/25</a:t>
+              <a:t>7/7/25</a:t>
             </a:fld>
             <a:endParaRPr lang="en-US"/>
           </a:p>
@@ -2376,7 +2381,7 @@
           <a:p>
             <a:fld id="{EE9B9D98-8075-6C49-AFE3-7775BFE0A702}" type="datetimeFigureOut">
               <a:rPr lang="en-US" smtClean="0"/>
-              <a:t>7/6/25</a:t>
+              <a:t>7/7/25</a:t>
             </a:fld>
             <a:endParaRPr lang="en-US"/>
           </a:p>
@@ -2664,7 +2669,7 @@
           <a:p>
             <a:fld id="{EE9B9D98-8075-6C49-AFE3-7775BFE0A702}" type="datetimeFigureOut">
               <a:rPr lang="en-US" smtClean="0"/>
-              <a:t>7/6/25</a:t>
+              <a:t>7/7/25</a:t>
             </a:fld>
             <a:endParaRPr lang="en-US"/>
           </a:p>
@@ -2905,7 +2910,7 @@
           <a:p>
             <a:fld id="{EE9B9D98-8075-6C49-AFE3-7775BFE0A702}" type="datetimeFigureOut">
               <a:rPr lang="en-US" smtClean="0"/>
-              <a:t>7/6/25</a:t>
+              <a:t>7/7/25</a:t>
             </a:fld>
             <a:endParaRPr lang="en-US"/>
           </a:p>
@@ -3417,7 +3422,7 @@
         <p:spPr>
           <a:xfrm>
             <a:off x="1265274" y="2137144"/>
-            <a:ext cx="2275368" cy="3413051"/>
+            <a:ext cx="2275368" cy="4042939"/>
           </a:xfrm>
           <a:prstGeom prst="rect">
             <a:avLst/>
@@ -3481,6 +3486,20 @@
               </a:rPr>
               <a:t>Upload Metadata:</a:t>
             </a:r>
+          </a:p>
+          <a:p>
+            <a:endParaRPr lang="en-US" dirty="0">
+              <a:solidFill>
+                <a:schemeClr val="tx1"/>
+              </a:solidFill>
+            </a:endParaRPr>
+          </a:p>
+          <a:p>
+            <a:endParaRPr lang="en-US" dirty="0">
+              <a:solidFill>
+                <a:schemeClr val="tx1"/>
+              </a:solidFill>
+            </a:endParaRPr>
           </a:p>
           <a:p>
             <a:endParaRPr lang="en-US" dirty="0">
@@ -3645,7 +3664,7 @@
         </p:nvSpPr>
         <p:spPr>
           <a:xfrm>
-            <a:off x="1382233" y="5108944"/>
+            <a:off x="1382233" y="5398479"/>
             <a:ext cx="489097" cy="287079"/>
           </a:xfrm>
           <a:prstGeom prst="roundRect">
@@ -3703,7 +3722,7 @@
         </p:nvSpPr>
         <p:spPr>
           <a:xfrm>
-            <a:off x="1382233" y="4401879"/>
+            <a:off x="1382233" y="4941390"/>
             <a:ext cx="1860697" cy="287079"/>
           </a:xfrm>
           <a:prstGeom prst="rect">
@@ -3738,6 +3757,64 @@
           <a:p>
             <a:pPr algn="ctr"/>
             <a:endParaRPr lang="en-US"/>
+          </a:p>
+        </p:txBody>
+      </p:sp>
+      <p:sp>
+        <p:nvSpPr>
+          <p:cNvPr id="5" name="Rounded Rectangle 4">
+            <a:extLst>
+              <a:ext uri="{FF2B5EF4-FFF2-40B4-BE49-F238E27FC236}">
+                <a16:creationId xmlns:a16="http://schemas.microsoft.com/office/drawing/2014/main" id="{A016C2BA-F0CB-A7C6-E5D6-B3C707A85D92}"/>
+              </a:ext>
+            </a:extLst>
+          </p:cNvPr>
+          <p:cNvSpPr/>
+          <p:nvPr/>
+        </p:nvSpPr>
+        <p:spPr>
+          <a:xfrm>
+            <a:off x="1382232" y="3846236"/>
+            <a:ext cx="1584251" cy="287079"/>
+          </a:xfrm>
+          <a:prstGeom prst="roundRect">
+            <a:avLst/>
+          </a:prstGeom>
+          <a:solidFill>
+            <a:schemeClr val="bg2"/>
+          </a:solidFill>
+          <a:ln>
+            <a:noFill/>
+          </a:ln>
+        </p:spPr>
+        <p:style>
+          <a:lnRef idx="2">
+            <a:schemeClr val="accent1">
+              <a:shade val="15000"/>
+            </a:schemeClr>
+          </a:lnRef>
+          <a:fillRef idx="1">
+            <a:schemeClr val="accent1"/>
+          </a:fillRef>
+          <a:effectRef idx="0">
+            <a:schemeClr val="accent1"/>
+          </a:effectRef>
+          <a:fontRef idx="minor">
+            <a:schemeClr val="lt1"/>
+          </a:fontRef>
+        </p:style>
+        <p:txBody>
+          <a:bodyPr rtlCol="0" anchor="ctr"/>
+          <a:lstStyle/>
+          <a:p>
+            <a:r>
+              <a:rPr lang="en-US" sz="1200" dirty="0">
+                <a:solidFill>
+                  <a:schemeClr val="tx1"/>
+                </a:solidFill>
+              </a:rPr>
+              <a:t>Download template</a:t>
+            </a:r>
           </a:p>
         </p:txBody>
       </p:sp>

</xml_diff>